<commit_message>
Added data new banks and updated manusript
</commit_message>
<xml_diff>
--- a/data/Data_diagram.pptx
+++ b/data/Data_diagram.pptx
@@ -104,15 +104,12 @@
       </a:defRPr>
     </a:lvl9pPr>
   </p:defaultTextStyle>
+  <p:extLst>
+    <p:ext uri="{EFAFB233-063F-42B5-8137-9DF3F51BA10A}">
+      <p15:sldGuideLst xmlns:p15="http://schemas.microsoft.com/office/powerpoint/2012/main"/>
+    </p:ext>
+  </p:extLst>
 </p:presentation>
-</file>
-
-<file path=ppt/revisionInfo.xml><?xml version="1.0" encoding="utf-8"?>
-<p1510:revInfo xmlns:a="http://schemas.openxmlformats.org/drawingml/2006/main" xmlns:r="http://schemas.openxmlformats.org/officeDocument/2006/relationships" xmlns:p1510="http://schemas.microsoft.com/office/powerpoint/2015/10/main">
-  <p1510:revLst>
-    <p1510:client id="{3E99FF7E-D9E2-4373-B678-49CD9C3A085B}" v="4" dt="2021-08-25T08:44:58.403"/>
-  </p1510:revLst>
-</p1510:revInfo>
 </file>
 
 <file path=ppt/changesInfos/changesInfo1.xml><?xml version="1.0" encoding="utf-8"?>
@@ -293,6 +290,38 @@
       </pc:sldChg>
     </pc:docChg>
   </pc:docChgLst>
+  <pc:docChgLst>
+    <pc:chgData name="Emiliano A. Carlevaro" userId="9bf72e6496f26e8d" providerId="LiveId" clId="{14779432-456F-4885-9567-C0C14371DCC3}"/>
+    <pc:docChg chg="modSld">
+      <pc:chgData name="Emiliano A. Carlevaro" userId="9bf72e6496f26e8d" providerId="LiveId" clId="{14779432-456F-4885-9567-C0C14371DCC3}" dt="2022-02-21T01:26:41.919" v="1" actId="1076"/>
+      <pc:docMkLst>
+        <pc:docMk/>
+      </pc:docMkLst>
+      <pc:sldChg chg="modSp mod">
+        <pc:chgData name="Emiliano A. Carlevaro" userId="9bf72e6496f26e8d" providerId="LiveId" clId="{14779432-456F-4885-9567-C0C14371DCC3}" dt="2022-02-21T01:26:41.919" v="1" actId="1076"/>
+        <pc:sldMkLst>
+          <pc:docMk/>
+          <pc:sldMk cId="3448824679" sldId="256"/>
+        </pc:sldMkLst>
+        <pc:grpChg chg="mod">
+          <ac:chgData name="Emiliano A. Carlevaro" userId="9bf72e6496f26e8d" providerId="LiveId" clId="{14779432-456F-4885-9567-C0C14371DCC3}" dt="2022-02-21T01:26:41.919" v="1" actId="1076"/>
+          <ac:grpSpMkLst>
+            <pc:docMk/>
+            <pc:sldMk cId="3448824679" sldId="256"/>
+            <ac:grpSpMk id="21" creationId="{63A6AF85-C7A7-4685-8054-755D9B7E6CBC}"/>
+          </ac:grpSpMkLst>
+        </pc:grpChg>
+        <pc:cxnChg chg="mod">
+          <ac:chgData name="Emiliano A. Carlevaro" userId="9bf72e6496f26e8d" providerId="LiveId" clId="{14779432-456F-4885-9567-C0C14371DCC3}" dt="2022-02-21T01:26:37.038" v="0" actId="1076"/>
+          <ac:cxnSpMkLst>
+            <pc:docMk/>
+            <pc:sldMk cId="3448824679" sldId="256"/>
+            <ac:cxnSpMk id="39" creationId="{8920B183-C11A-46D2-9A7D-C69BEB323195}"/>
+          </ac:cxnSpMkLst>
+        </pc:cxnChg>
+      </pc:sldChg>
+    </pc:docChg>
+  </pc:docChgLst>
 </pc:chgInfo>
 </file>
 
@@ -445,7 +474,7 @@
           <a:p>
             <a:fld id="{5E172ADD-CE1B-41AF-B922-2BD56856D755}" type="datetimeFigureOut">
               <a:rPr lang="en-AU" smtClean="0"/>
-              <a:t>25/08/2021</a:t>
+              <a:t>21/02/2022</a:t>
             </a:fld>
             <a:endParaRPr lang="en-AU"/>
           </a:p>
@@ -645,7 +674,7 @@
           <a:p>
             <a:fld id="{5E172ADD-CE1B-41AF-B922-2BD56856D755}" type="datetimeFigureOut">
               <a:rPr lang="en-AU" smtClean="0"/>
-              <a:t>25/08/2021</a:t>
+              <a:t>21/02/2022</a:t>
             </a:fld>
             <a:endParaRPr lang="en-AU"/>
           </a:p>
@@ -855,7 +884,7 @@
           <a:p>
             <a:fld id="{5E172ADD-CE1B-41AF-B922-2BD56856D755}" type="datetimeFigureOut">
               <a:rPr lang="en-AU" smtClean="0"/>
-              <a:t>25/08/2021</a:t>
+              <a:t>21/02/2022</a:t>
             </a:fld>
             <a:endParaRPr lang="en-AU"/>
           </a:p>
@@ -1055,7 +1084,7 @@
           <a:p>
             <a:fld id="{5E172ADD-CE1B-41AF-B922-2BD56856D755}" type="datetimeFigureOut">
               <a:rPr lang="en-AU" smtClean="0"/>
-              <a:t>25/08/2021</a:t>
+              <a:t>21/02/2022</a:t>
             </a:fld>
             <a:endParaRPr lang="en-AU"/>
           </a:p>
@@ -1331,7 +1360,7 @@
           <a:p>
             <a:fld id="{5E172ADD-CE1B-41AF-B922-2BD56856D755}" type="datetimeFigureOut">
               <a:rPr lang="en-AU" smtClean="0"/>
-              <a:t>25/08/2021</a:t>
+              <a:t>21/02/2022</a:t>
             </a:fld>
             <a:endParaRPr lang="en-AU"/>
           </a:p>
@@ -1599,7 +1628,7 @@
           <a:p>
             <a:fld id="{5E172ADD-CE1B-41AF-B922-2BD56856D755}" type="datetimeFigureOut">
               <a:rPr lang="en-AU" smtClean="0"/>
-              <a:t>25/08/2021</a:t>
+              <a:t>21/02/2022</a:t>
             </a:fld>
             <a:endParaRPr lang="en-AU"/>
           </a:p>
@@ -2014,7 +2043,7 @@
           <a:p>
             <a:fld id="{5E172ADD-CE1B-41AF-B922-2BD56856D755}" type="datetimeFigureOut">
               <a:rPr lang="en-AU" smtClean="0"/>
-              <a:t>25/08/2021</a:t>
+              <a:t>21/02/2022</a:t>
             </a:fld>
             <a:endParaRPr lang="en-AU"/>
           </a:p>
@@ -2156,7 +2185,7 @@
           <a:p>
             <a:fld id="{5E172ADD-CE1B-41AF-B922-2BD56856D755}" type="datetimeFigureOut">
               <a:rPr lang="en-AU" smtClean="0"/>
-              <a:t>25/08/2021</a:t>
+              <a:t>21/02/2022</a:t>
             </a:fld>
             <a:endParaRPr lang="en-AU"/>
           </a:p>
@@ -2269,7 +2298,7 @@
           <a:p>
             <a:fld id="{5E172ADD-CE1B-41AF-B922-2BD56856D755}" type="datetimeFigureOut">
               <a:rPr lang="en-AU" smtClean="0"/>
-              <a:t>25/08/2021</a:t>
+              <a:t>21/02/2022</a:t>
             </a:fld>
             <a:endParaRPr lang="en-AU"/>
           </a:p>
@@ -2582,7 +2611,7 @@
           <a:p>
             <a:fld id="{5E172ADD-CE1B-41AF-B922-2BD56856D755}" type="datetimeFigureOut">
               <a:rPr lang="en-AU" smtClean="0"/>
-              <a:t>25/08/2021</a:t>
+              <a:t>21/02/2022</a:t>
             </a:fld>
             <a:endParaRPr lang="en-AU"/>
           </a:p>
@@ -2871,7 +2900,7 @@
           <a:p>
             <a:fld id="{5E172ADD-CE1B-41AF-B922-2BD56856D755}" type="datetimeFigureOut">
               <a:rPr lang="en-AU" smtClean="0"/>
-              <a:t>25/08/2021</a:t>
+              <a:t>21/02/2022</a:t>
             </a:fld>
             <a:endParaRPr lang="en-AU"/>
           </a:p>
@@ -3114,7 +3143,7 @@
           <a:p>
             <a:fld id="{5E172ADD-CE1B-41AF-B922-2BD56856D755}" type="datetimeFigureOut">
               <a:rPr lang="en-AU" smtClean="0"/>
-              <a:t>25/08/2021</a:t>
+              <a:t>21/02/2022</a:t>
             </a:fld>
             <a:endParaRPr lang="en-AU"/>
           </a:p>
@@ -4118,7 +4147,7 @@
         </p:nvGrpSpPr>
         <p:grpSpPr>
           <a:xfrm>
-            <a:off x="5626902" y="3445502"/>
+            <a:off x="5490501" y="3498077"/>
             <a:ext cx="1428750" cy="748406"/>
             <a:chOff x="3708307" y="2328170"/>
             <a:chExt cx="1428750" cy="748406"/>
@@ -4741,14 +4770,12 @@
           </p:cNvPr>
           <p:cNvCxnSpPr>
             <a:cxnSpLocks/>
-            <a:stCxn id="23" idx="1"/>
-            <a:endCxn id="34" idx="3"/>
           </p:cNvCxnSpPr>
           <p:nvPr/>
         </p:nvCxnSpPr>
         <p:spPr>
           <a:xfrm rot="10800000">
-            <a:off x="1680654" y="1655711"/>
+            <a:off x="1619281" y="1843381"/>
             <a:ext cx="3946248" cy="2163994"/>
           </a:xfrm>
           <a:prstGeom prst="bentConnector3">

</xml_diff>